<commit_message>
Added documentation, and also some picture files, but those shouldn't affect anything
</commit_message>
<xml_diff>
--- a/docs/model_design/model_design_v3.0_0429.pptx
+++ b/docs/model_design/model_design_v3.0_0429.pptx
@@ -254,7 +254,7 @@
           <a:p>
             <a:fld id="{75F1E914-A6F4-3045-9D3D-73FD47E80560}" type="datetimeFigureOut">
               <a:rPr lang="en-US" smtClean="0"/>
-              <a:t>4/29/2019</a:t>
+              <a:t>5/1/19</a:t>
             </a:fld>
             <a:endParaRPr lang="en-US"/>
           </a:p>
@@ -424,7 +424,7 @@
           <a:p>
             <a:fld id="{75F1E914-A6F4-3045-9D3D-73FD47E80560}" type="datetimeFigureOut">
               <a:rPr lang="en-US" smtClean="0"/>
-              <a:t>4/29/2019</a:t>
+              <a:t>5/1/19</a:t>
             </a:fld>
             <a:endParaRPr lang="en-US"/>
           </a:p>
@@ -604,7 +604,7 @@
           <a:p>
             <a:fld id="{75F1E914-A6F4-3045-9D3D-73FD47E80560}" type="datetimeFigureOut">
               <a:rPr lang="en-US" smtClean="0"/>
-              <a:t>4/29/2019</a:t>
+              <a:t>5/1/19</a:t>
             </a:fld>
             <a:endParaRPr lang="en-US"/>
           </a:p>
@@ -774,7 +774,7 @@
           <a:p>
             <a:fld id="{75F1E914-A6F4-3045-9D3D-73FD47E80560}" type="datetimeFigureOut">
               <a:rPr lang="en-US" smtClean="0"/>
-              <a:t>4/29/2019</a:t>
+              <a:t>5/1/19</a:t>
             </a:fld>
             <a:endParaRPr lang="en-US"/>
           </a:p>
@@ -1018,7 +1018,7 @@
           <a:p>
             <a:fld id="{75F1E914-A6F4-3045-9D3D-73FD47E80560}" type="datetimeFigureOut">
               <a:rPr lang="en-US" smtClean="0"/>
-              <a:t>4/29/2019</a:t>
+              <a:t>5/1/19</a:t>
             </a:fld>
             <a:endParaRPr lang="en-US"/>
           </a:p>
@@ -1250,7 +1250,7 @@
           <a:p>
             <a:fld id="{75F1E914-A6F4-3045-9D3D-73FD47E80560}" type="datetimeFigureOut">
               <a:rPr lang="en-US" smtClean="0"/>
-              <a:t>4/29/2019</a:t>
+              <a:t>5/1/19</a:t>
             </a:fld>
             <a:endParaRPr lang="en-US"/>
           </a:p>
@@ -1617,7 +1617,7 @@
           <a:p>
             <a:fld id="{75F1E914-A6F4-3045-9D3D-73FD47E80560}" type="datetimeFigureOut">
               <a:rPr lang="en-US" smtClean="0"/>
-              <a:t>4/29/2019</a:t>
+              <a:t>5/1/19</a:t>
             </a:fld>
             <a:endParaRPr lang="en-US"/>
           </a:p>
@@ -1735,7 +1735,7 @@
           <a:p>
             <a:fld id="{75F1E914-A6F4-3045-9D3D-73FD47E80560}" type="datetimeFigureOut">
               <a:rPr lang="en-US" smtClean="0"/>
-              <a:t>4/29/2019</a:t>
+              <a:t>5/1/19</a:t>
             </a:fld>
             <a:endParaRPr lang="en-US"/>
           </a:p>
@@ -1830,7 +1830,7 @@
           <a:p>
             <a:fld id="{75F1E914-A6F4-3045-9D3D-73FD47E80560}" type="datetimeFigureOut">
               <a:rPr lang="en-US" smtClean="0"/>
-              <a:t>4/29/2019</a:t>
+              <a:t>5/1/19</a:t>
             </a:fld>
             <a:endParaRPr lang="en-US"/>
           </a:p>
@@ -2107,7 +2107,7 @@
           <a:p>
             <a:fld id="{75F1E914-A6F4-3045-9D3D-73FD47E80560}" type="datetimeFigureOut">
               <a:rPr lang="en-US" smtClean="0"/>
-              <a:t>4/29/2019</a:t>
+              <a:t>5/1/19</a:t>
             </a:fld>
             <a:endParaRPr lang="en-US"/>
           </a:p>
@@ -2364,7 +2364,7 @@
           <a:p>
             <a:fld id="{75F1E914-A6F4-3045-9D3D-73FD47E80560}" type="datetimeFigureOut">
               <a:rPr lang="en-US" smtClean="0"/>
-              <a:t>4/29/2019</a:t>
+              <a:t>5/1/19</a:t>
             </a:fld>
             <a:endParaRPr lang="en-US"/>
           </a:p>
@@ -2577,7 +2577,7 @@
           <a:p>
             <a:fld id="{75F1E914-A6F4-3045-9D3D-73FD47E80560}" type="datetimeFigureOut">
               <a:rPr lang="en-US" smtClean="0"/>
-              <a:t>4/29/2019</a:t>
+              <a:t>5/1/19</a:t>
             </a:fld>
             <a:endParaRPr lang="en-US"/>
           </a:p>
@@ -2996,7 +2996,7 @@
         </p:nvGrpSpPr>
         <p:grpSpPr>
           <a:xfrm>
-            <a:off x="424213" y="1992116"/>
+            <a:off x="371613" y="2010464"/>
             <a:ext cx="10689050" cy="7051038"/>
             <a:chOff x="153083" y="785327"/>
             <a:chExt cx="10689050" cy="7051038"/>
@@ -6742,7 +6742,7 @@
         </p:nvCxnSpPr>
         <p:spPr>
           <a:xfrm rot="10800000">
-            <a:off x="433388" y="1300186"/>
+            <a:off x="380788" y="1318534"/>
             <a:ext cx="2298104" cy="2331728"/>
           </a:xfrm>
           <a:prstGeom prst="bentConnector2">
@@ -7948,6 +7948,972 @@
                 <a:latin typeface="Arial Narrow" panose="020B0604020202020204" pitchFamily="34" charset="0"/>
               </a:rPr>
               <a:t>subject</a:t>
+            </a:r>
+          </a:p>
+        </p:txBody>
+      </p:sp>
+      <p:sp>
+        <p:nvSpPr>
+          <p:cNvPr id="91" name="TextBox 90">
+            <a:extLst>
+              <a:ext uri="{FF2B5EF4-FFF2-40B4-BE49-F238E27FC236}">
+                <a16:creationId xmlns:a16="http://schemas.microsoft.com/office/drawing/2014/main" id="{350F84FA-B3D8-9041-88C1-0B8E059B3616}"/>
+              </a:ext>
+            </a:extLst>
+          </p:cNvPr>
+          <p:cNvSpPr txBox="1"/>
+          <p:nvPr/>
+        </p:nvSpPr>
+        <p:spPr>
+          <a:xfrm>
+            <a:off x="3657605" y="7328871"/>
+            <a:ext cx="1656261" cy="1200329"/>
+          </a:xfrm>
+          <a:prstGeom prst="rect">
+            <a:avLst/>
+          </a:prstGeom>
+          <a:noFill/>
+          <a:ln w="12700">
+            <a:solidFill>
+              <a:schemeClr val="tx1"/>
+            </a:solidFill>
+          </a:ln>
+        </p:spPr>
+        <p:txBody>
+          <a:bodyPr wrap="square" rtlCol="0">
+            <a:spAutoFit/>
+          </a:bodyPr>
+          <a:lstStyle/>
+          <a:p>
+            <a:pPr>
+              <a:defRPr/>
+            </a:pPr>
+            <a:r>
+              <a:rPr lang="en-US" sz="1200" dirty="0">
+                <a:solidFill>
+                  <a:prstClr val="black"/>
+                </a:solidFill>
+                <a:latin typeface="Arial Narrow" panose="020B0604020202020204" pitchFamily="34" charset="0"/>
+                <a:cs typeface="Arial Narrow" panose="020B0604020202020204" pitchFamily="34" charset="0"/>
+              </a:rPr>
+              <a:t>Reviews</a:t>
+            </a:r>
+          </a:p>
+          <a:p>
+            <a:pPr>
+              <a:defRPr/>
+            </a:pPr>
+            <a:r>
+              <a:rPr lang="en-US" sz="1200" dirty="0">
+                <a:solidFill>
+                  <a:prstClr val="black"/>
+                </a:solidFill>
+                <a:latin typeface="Arial Narrow" panose="020B0604020202020204" pitchFamily="34" charset="0"/>
+                <a:cs typeface="Arial Narrow" panose="020B0604020202020204" pitchFamily="34" charset="0"/>
+              </a:rPr>
+              <a:t>_____________________product : integer</a:t>
+            </a:r>
+          </a:p>
+          <a:p>
+            <a:pPr lvl="0">
+              <a:defRPr/>
+            </a:pPr>
+            <a:r>
+              <a:rPr lang="en-US" sz="1200" dirty="0">
+                <a:solidFill>
+                  <a:prstClr val="black"/>
+                </a:solidFill>
+                <a:latin typeface="Arial Narrow" panose="020B0604020202020204" pitchFamily="34" charset="0"/>
+                <a:cs typeface="Arial Narrow" panose="020B0604020202020204" pitchFamily="34" charset="0"/>
+              </a:rPr>
+              <a:t>description : string</a:t>
+            </a:r>
+          </a:p>
+          <a:p>
+            <a:pPr>
+              <a:defRPr/>
+            </a:pPr>
+            <a:r>
+              <a:rPr lang="en-US" sz="1200" dirty="0">
+                <a:solidFill>
+                  <a:prstClr val="black"/>
+                </a:solidFill>
+                <a:latin typeface="Arial Narrow" panose="020B0604020202020204" pitchFamily="34" charset="0"/>
+                <a:cs typeface="Arial Narrow" panose="020B0604020202020204" pitchFamily="34" charset="0"/>
+              </a:rPr>
+              <a:t>owner: string</a:t>
+            </a:r>
+          </a:p>
+          <a:p>
+            <a:pPr>
+              <a:defRPr/>
+            </a:pPr>
+            <a:r>
+              <a:rPr lang="en-US" sz="1200" dirty="0">
+                <a:solidFill>
+                  <a:prstClr val="black"/>
+                </a:solidFill>
+                <a:latin typeface="Arial Narrow" panose="020B0604020202020204" pitchFamily="34" charset="0"/>
+                <a:cs typeface="Arial Narrow" panose="020B0604020202020204" pitchFamily="34" charset="0"/>
+              </a:rPr>
+              <a:t>reviewer: integer</a:t>
+            </a:r>
+          </a:p>
+        </p:txBody>
+      </p:sp>
+      <p:cxnSp>
+        <p:nvCxnSpPr>
+          <p:cNvPr id="92" name="Straight Connector 91">
+            <a:extLst>
+              <a:ext uri="{FF2B5EF4-FFF2-40B4-BE49-F238E27FC236}">
+                <a16:creationId xmlns:a16="http://schemas.microsoft.com/office/drawing/2014/main" id="{0C2E66A6-3340-2245-990A-B82C89531DD7}"/>
+              </a:ext>
+            </a:extLst>
+          </p:cNvPr>
+          <p:cNvCxnSpPr>
+            <a:cxnSpLocks/>
+            <a:stCxn id="91" idx="0"/>
+          </p:cNvCxnSpPr>
+          <p:nvPr/>
+        </p:nvCxnSpPr>
+        <p:spPr>
+          <a:xfrm flipH="1" flipV="1">
+            <a:off x="3510592" y="4332539"/>
+            <a:ext cx="975144" cy="2996332"/>
+          </a:xfrm>
+          <a:prstGeom prst="line">
+            <a:avLst/>
+          </a:prstGeom>
+          <a:ln w="12700">
+            <a:solidFill>
+              <a:schemeClr val="tx1"/>
+            </a:solidFill>
+          </a:ln>
+        </p:spPr>
+        <p:style>
+          <a:lnRef idx="1">
+            <a:schemeClr val="accent1"/>
+          </a:lnRef>
+          <a:fillRef idx="0">
+            <a:schemeClr val="accent1"/>
+          </a:fillRef>
+          <a:effectRef idx="0">
+            <a:schemeClr val="accent1"/>
+          </a:effectRef>
+          <a:fontRef idx="minor">
+            <a:schemeClr val="tx1"/>
+          </a:fontRef>
+        </p:style>
+      </p:cxnSp>
+      <p:sp>
+        <p:nvSpPr>
+          <p:cNvPr id="96" name="Rectangle 95">
+            <a:extLst>
+              <a:ext uri="{FF2B5EF4-FFF2-40B4-BE49-F238E27FC236}">
+                <a16:creationId xmlns:a16="http://schemas.microsoft.com/office/drawing/2014/main" id="{F8F4DBEA-082C-0C40-A0BD-E59F5CDA9F8E}"/>
+              </a:ext>
+            </a:extLst>
+          </p:cNvPr>
+          <p:cNvSpPr/>
+          <p:nvPr/>
+        </p:nvSpPr>
+        <p:spPr>
+          <a:xfrm>
+            <a:off x="4023819" y="5971290"/>
+            <a:ext cx="543140" cy="276998"/>
+          </a:xfrm>
+          <a:prstGeom prst="rect">
+            <a:avLst/>
+          </a:prstGeom>
+        </p:spPr>
+        <p:txBody>
+          <a:bodyPr wrap="square">
+            <a:spAutoFit/>
+          </a:bodyPr>
+          <a:lstStyle/>
+          <a:p>
+            <a:pPr algn="ctr">
+              <a:defRPr/>
+            </a:pPr>
+            <a:r>
+              <a:rPr lang="en-US" sz="1200" dirty="0">
+                <a:solidFill>
+                  <a:prstClr val="black"/>
+                </a:solidFill>
+                <a:latin typeface="Arial Narrow" panose="020B0604020202020204" pitchFamily="34" charset="0"/>
+                <a:cs typeface="Arial Narrow" panose="020B0604020202020204" pitchFamily="34" charset="0"/>
+              </a:rPr>
+              <a:t>has</a:t>
+            </a:r>
+          </a:p>
+        </p:txBody>
+      </p:sp>
+      <p:sp>
+        <p:nvSpPr>
+          <p:cNvPr id="97" name="Rectangle 96">
+            <a:extLst>
+              <a:ext uri="{FF2B5EF4-FFF2-40B4-BE49-F238E27FC236}">
+                <a16:creationId xmlns:a16="http://schemas.microsoft.com/office/drawing/2014/main" id="{ACD46C8A-ABA1-FD4B-8B88-2A43EE78C7DC}"/>
+              </a:ext>
+            </a:extLst>
+          </p:cNvPr>
+          <p:cNvSpPr/>
+          <p:nvPr/>
+        </p:nvSpPr>
+        <p:spPr>
+          <a:xfrm>
+            <a:off x="3407544" y="4355646"/>
+            <a:ext cx="543140" cy="276998"/>
+          </a:xfrm>
+          <a:prstGeom prst="rect">
+            <a:avLst/>
+          </a:prstGeom>
+        </p:spPr>
+        <p:txBody>
+          <a:bodyPr wrap="square">
+            <a:spAutoFit/>
+          </a:bodyPr>
+          <a:lstStyle/>
+          <a:p>
+            <a:pPr algn="ctr">
+              <a:defRPr/>
+            </a:pPr>
+            <a:r>
+              <a:rPr lang="en-US" sz="1200" dirty="0">
+                <a:solidFill>
+                  <a:prstClr val="black"/>
+                </a:solidFill>
+                <a:latin typeface="Arial Narrow" panose="020B0604020202020204" pitchFamily="34" charset="0"/>
+                <a:cs typeface="Arial Narrow" panose="020B0604020202020204" pitchFamily="34" charset="0"/>
+              </a:rPr>
+              <a:t>1</a:t>
+            </a:r>
+          </a:p>
+        </p:txBody>
+      </p:sp>
+      <p:sp>
+        <p:nvSpPr>
+          <p:cNvPr id="101" name="Rectangle 100">
+            <a:extLst>
+              <a:ext uri="{FF2B5EF4-FFF2-40B4-BE49-F238E27FC236}">
+                <a16:creationId xmlns:a16="http://schemas.microsoft.com/office/drawing/2014/main" id="{F4E1A734-456F-114F-B92B-DC26EE77B650}"/>
+              </a:ext>
+            </a:extLst>
+          </p:cNvPr>
+          <p:cNvSpPr/>
+          <p:nvPr/>
+        </p:nvSpPr>
+        <p:spPr>
+          <a:xfrm rot="19381042">
+            <a:off x="4195496" y="6146418"/>
+            <a:ext cx="405555" cy="276998"/>
+          </a:xfrm>
+          <a:prstGeom prst="rect">
+            <a:avLst/>
+          </a:prstGeom>
+        </p:spPr>
+        <p:txBody>
+          <a:bodyPr wrap="square">
+            <a:spAutoFit/>
+          </a:bodyPr>
+          <a:lstStyle/>
+          <a:p>
+            <a:pPr>
+              <a:defRPr/>
+            </a:pPr>
+            <a:r>
+              <a:rPr lang="en-US" sz="1200" dirty="0">
+                <a:solidFill>
+                  <a:prstClr val="black"/>
+                </a:solidFill>
+                <a:latin typeface="Arial Narrow" panose="020B0604020202020204" pitchFamily="34" charset="0"/>
+                <a:cs typeface="Arial Narrow" panose="020B0604020202020204" pitchFamily="34" charset="0"/>
+              </a:rPr>
+              <a:t>▼</a:t>
+            </a:r>
+            <a:endParaRPr lang="en-US" sz="1200" dirty="0">
+              <a:solidFill>
+                <a:prstClr val="black"/>
+              </a:solidFill>
+              <a:latin typeface="Calibri" panose="020F0502020204030204"/>
+            </a:endParaRPr>
+          </a:p>
+        </p:txBody>
+      </p:sp>
+      <p:sp>
+        <p:nvSpPr>
+          <p:cNvPr id="102" name="TextBox 101">
+            <a:extLst>
+              <a:ext uri="{FF2B5EF4-FFF2-40B4-BE49-F238E27FC236}">
+                <a16:creationId xmlns:a16="http://schemas.microsoft.com/office/drawing/2014/main" id="{3FBB3270-AD31-2749-BCBF-32A41D1698A4}"/>
+              </a:ext>
+            </a:extLst>
+          </p:cNvPr>
+          <p:cNvSpPr txBox="1"/>
+          <p:nvPr/>
+        </p:nvSpPr>
+        <p:spPr>
+          <a:xfrm>
+            <a:off x="4826161" y="5406666"/>
+            <a:ext cx="375424" cy="276999"/>
+          </a:xfrm>
+          <a:prstGeom prst="rect">
+            <a:avLst/>
+          </a:prstGeom>
+          <a:noFill/>
+          <a:ln w="12700">
+            <a:noFill/>
+          </a:ln>
+        </p:spPr>
+        <p:txBody>
+          <a:bodyPr wrap="square" rtlCol="0">
+            <a:spAutoFit/>
+          </a:bodyPr>
+          <a:lstStyle/>
+          <a:p>
+            <a:pPr>
+              <a:defRPr/>
+            </a:pPr>
+            <a:r>
+              <a:rPr lang="en-US" sz="1200" dirty="0">
+                <a:solidFill>
+                  <a:prstClr val="black"/>
+                </a:solidFill>
+                <a:latin typeface="Arial Narrow" panose="020B0604020202020204" pitchFamily="34" charset="0"/>
+                <a:cs typeface="Arial Narrow" panose="020B0604020202020204" pitchFamily="34" charset="0"/>
+              </a:rPr>
+              <a:t>*</a:t>
+            </a:r>
+          </a:p>
+        </p:txBody>
+      </p:sp>
+      <p:sp>
+        <p:nvSpPr>
+          <p:cNvPr id="104" name="TextBox 103">
+            <a:extLst>
+              <a:ext uri="{FF2B5EF4-FFF2-40B4-BE49-F238E27FC236}">
+                <a16:creationId xmlns:a16="http://schemas.microsoft.com/office/drawing/2014/main" id="{8D36396C-866B-1E43-B020-789484C9E40C}"/>
+              </a:ext>
+            </a:extLst>
+          </p:cNvPr>
+          <p:cNvSpPr txBox="1"/>
+          <p:nvPr/>
+        </p:nvSpPr>
+        <p:spPr>
+          <a:xfrm>
+            <a:off x="4773561" y="5425014"/>
+            <a:ext cx="375424" cy="276999"/>
+          </a:xfrm>
+          <a:prstGeom prst="rect">
+            <a:avLst/>
+          </a:prstGeom>
+          <a:noFill/>
+          <a:ln w="12700">
+            <a:noFill/>
+          </a:ln>
+        </p:spPr>
+        <p:txBody>
+          <a:bodyPr wrap="square" rtlCol="0">
+            <a:spAutoFit/>
+          </a:bodyPr>
+          <a:lstStyle/>
+          <a:p>
+            <a:pPr>
+              <a:defRPr/>
+            </a:pPr>
+            <a:r>
+              <a:rPr lang="en-US" sz="1200" dirty="0">
+                <a:solidFill>
+                  <a:prstClr val="black"/>
+                </a:solidFill>
+                <a:latin typeface="Arial Narrow" panose="020B0604020202020204" pitchFamily="34" charset="0"/>
+                <a:cs typeface="Arial Narrow" panose="020B0604020202020204" pitchFamily="34" charset="0"/>
+              </a:rPr>
+              <a:t>*</a:t>
+            </a:r>
+          </a:p>
+        </p:txBody>
+      </p:sp>
+      <p:sp>
+        <p:nvSpPr>
+          <p:cNvPr id="69" name="TextBox 68">
+            <a:extLst>
+              <a:ext uri="{FF2B5EF4-FFF2-40B4-BE49-F238E27FC236}">
+                <a16:creationId xmlns:a16="http://schemas.microsoft.com/office/drawing/2014/main" id="{785A0BCF-7C72-4844-AE1F-3F2957110D66}"/>
+              </a:ext>
+            </a:extLst>
+          </p:cNvPr>
+          <p:cNvSpPr txBox="1"/>
+          <p:nvPr/>
+        </p:nvSpPr>
+        <p:spPr>
+          <a:xfrm>
+            <a:off x="4499119" y="7133765"/>
+            <a:ext cx="300082" cy="369332"/>
+          </a:xfrm>
+          <a:prstGeom prst="rect">
+            <a:avLst/>
+          </a:prstGeom>
+          <a:noFill/>
+        </p:spPr>
+        <p:txBody>
+          <a:bodyPr wrap="none" rtlCol="0">
+            <a:spAutoFit/>
+          </a:bodyPr>
+          <a:lstStyle/>
+          <a:p>
+            <a:r>
+              <a:rPr lang="en-US" dirty="0"/>
+              <a:t>*</a:t>
+            </a:r>
+          </a:p>
+        </p:txBody>
+      </p:sp>
+      <p:sp>
+        <p:nvSpPr>
+          <p:cNvPr id="106" name="TextBox 105">
+            <a:extLst>
+              <a:ext uri="{FF2B5EF4-FFF2-40B4-BE49-F238E27FC236}">
+                <a16:creationId xmlns:a16="http://schemas.microsoft.com/office/drawing/2014/main" id="{722E9435-E168-9548-954B-FC09F1ED9640}"/>
+              </a:ext>
+            </a:extLst>
+          </p:cNvPr>
+          <p:cNvSpPr txBox="1"/>
+          <p:nvPr/>
+        </p:nvSpPr>
+        <p:spPr>
+          <a:xfrm>
+            <a:off x="6940318" y="7318431"/>
+            <a:ext cx="1656261" cy="1384995"/>
+          </a:xfrm>
+          <a:prstGeom prst="rect">
+            <a:avLst/>
+          </a:prstGeom>
+          <a:noFill/>
+          <a:ln w="12700">
+            <a:solidFill>
+              <a:schemeClr val="tx1"/>
+            </a:solidFill>
+          </a:ln>
+        </p:spPr>
+        <p:txBody>
+          <a:bodyPr wrap="square" rtlCol="0">
+            <a:spAutoFit/>
+          </a:bodyPr>
+          <a:lstStyle/>
+          <a:p>
+            <a:pPr>
+              <a:defRPr/>
+            </a:pPr>
+            <a:r>
+              <a:rPr lang="en-US" sz="1200" dirty="0">
+                <a:solidFill>
+                  <a:prstClr val="black"/>
+                </a:solidFill>
+                <a:latin typeface="Arial Narrow" panose="020B0604020202020204" pitchFamily="34" charset="0"/>
+                <a:cs typeface="Arial Narrow" panose="020B0604020202020204" pitchFamily="34" charset="0"/>
+              </a:rPr>
+              <a:t>Pictures</a:t>
+            </a:r>
+          </a:p>
+          <a:p>
+            <a:pPr>
+              <a:defRPr/>
+            </a:pPr>
+            <a:r>
+              <a:rPr lang="en-US" sz="1200" dirty="0">
+                <a:solidFill>
+                  <a:prstClr val="black"/>
+                </a:solidFill>
+                <a:latin typeface="Arial Narrow" panose="020B0604020202020204" pitchFamily="34" charset="0"/>
+                <a:cs typeface="Arial Narrow" panose="020B0604020202020204" pitchFamily="34" charset="0"/>
+              </a:rPr>
+              <a:t>_____________________</a:t>
+            </a:r>
+            <a:r>
+              <a:rPr lang="en-US" sz="1200" dirty="0" err="1">
+                <a:solidFill>
+                  <a:prstClr val="black"/>
+                </a:solidFill>
+                <a:latin typeface="Arial Narrow" panose="020B0604020202020204" pitchFamily="34" charset="0"/>
+                <a:cs typeface="Arial Narrow" panose="020B0604020202020204" pitchFamily="34" charset="0"/>
+              </a:rPr>
+              <a:t>id:integer</a:t>
+            </a:r>
+            <a:endParaRPr lang="en-US" sz="1200" dirty="0">
+              <a:solidFill>
+                <a:prstClr val="black"/>
+              </a:solidFill>
+              <a:latin typeface="Arial Narrow" panose="020B0604020202020204" pitchFamily="34" charset="0"/>
+              <a:cs typeface="Arial Narrow" panose="020B0604020202020204" pitchFamily="34" charset="0"/>
+            </a:endParaRPr>
+          </a:p>
+          <a:p>
+            <a:pPr>
+              <a:defRPr/>
+            </a:pPr>
+            <a:r>
+              <a:rPr lang="en-US" sz="1200" dirty="0" err="1">
+                <a:solidFill>
+                  <a:prstClr val="black"/>
+                </a:solidFill>
+                <a:latin typeface="Arial Narrow" panose="020B0604020202020204" pitchFamily="34" charset="0"/>
+                <a:cs typeface="Arial Narrow" panose="020B0604020202020204" pitchFamily="34" charset="0"/>
+              </a:rPr>
+              <a:t>Image_file_name</a:t>
+            </a:r>
+            <a:r>
+              <a:rPr lang="en-US" sz="1200" dirty="0">
+                <a:solidFill>
+                  <a:prstClr val="black"/>
+                </a:solidFill>
+                <a:latin typeface="Arial Narrow" panose="020B0604020202020204" pitchFamily="34" charset="0"/>
+                <a:cs typeface="Arial Narrow" panose="020B0604020202020204" pitchFamily="34" charset="0"/>
+              </a:rPr>
+              <a:t>: text</a:t>
+            </a:r>
+          </a:p>
+          <a:p>
+            <a:pPr>
+              <a:defRPr/>
+            </a:pPr>
+            <a:r>
+              <a:rPr lang="en-US" sz="1200" dirty="0" err="1">
+                <a:solidFill>
+                  <a:prstClr val="black"/>
+                </a:solidFill>
+                <a:latin typeface="Arial Narrow" panose="020B0604020202020204" pitchFamily="34" charset="0"/>
+                <a:cs typeface="Arial Narrow" panose="020B0604020202020204" pitchFamily="34" charset="0"/>
+              </a:rPr>
+              <a:t>Image_content_type</a:t>
+            </a:r>
+            <a:r>
+              <a:rPr lang="en-US" sz="1200" dirty="0">
+                <a:solidFill>
+                  <a:prstClr val="black"/>
+                </a:solidFill>
+                <a:latin typeface="Arial Narrow" panose="020B0604020202020204" pitchFamily="34" charset="0"/>
+                <a:cs typeface="Arial Narrow" panose="020B0604020202020204" pitchFamily="34" charset="0"/>
+              </a:rPr>
+              <a:t>: text</a:t>
+            </a:r>
+          </a:p>
+          <a:p>
+            <a:pPr>
+              <a:defRPr/>
+            </a:pPr>
+            <a:r>
+              <a:rPr lang="en-US" sz="1200" dirty="0" err="1">
+                <a:solidFill>
+                  <a:prstClr val="black"/>
+                </a:solidFill>
+                <a:latin typeface="Arial Narrow" panose="020B0604020202020204" pitchFamily="34" charset="0"/>
+                <a:cs typeface="Arial Narrow" panose="020B0604020202020204" pitchFamily="34" charset="0"/>
+              </a:rPr>
+              <a:t>Image_file_size:integer</a:t>
+            </a:r>
+            <a:endParaRPr lang="en-US" sz="1200" dirty="0">
+              <a:solidFill>
+                <a:prstClr val="black"/>
+              </a:solidFill>
+              <a:latin typeface="Arial Narrow" panose="020B0604020202020204" pitchFamily="34" charset="0"/>
+              <a:cs typeface="Arial Narrow" panose="020B0604020202020204" pitchFamily="34" charset="0"/>
+            </a:endParaRPr>
+          </a:p>
+          <a:p>
+            <a:pPr>
+              <a:defRPr/>
+            </a:pPr>
+            <a:r>
+              <a:rPr lang="en-US" sz="1200" dirty="0" err="1">
+                <a:solidFill>
+                  <a:prstClr val="black"/>
+                </a:solidFill>
+                <a:latin typeface="Arial Narrow" panose="020B0604020202020204" pitchFamily="34" charset="0"/>
+                <a:cs typeface="Arial Narrow" panose="020B0604020202020204" pitchFamily="34" charset="0"/>
+              </a:rPr>
+              <a:t>Item_id</a:t>
+            </a:r>
+            <a:r>
+              <a:rPr lang="en-US" sz="1200" dirty="0">
+                <a:solidFill>
+                  <a:prstClr val="black"/>
+                </a:solidFill>
+                <a:latin typeface="Arial Narrow" panose="020B0604020202020204" pitchFamily="34" charset="0"/>
+                <a:cs typeface="Arial Narrow" panose="020B0604020202020204" pitchFamily="34" charset="0"/>
+              </a:rPr>
+              <a:t>: integer</a:t>
+            </a:r>
+          </a:p>
+        </p:txBody>
+      </p:sp>
+      <p:cxnSp>
+        <p:nvCxnSpPr>
+          <p:cNvPr id="107" name="Straight Connector 106">
+            <a:extLst>
+              <a:ext uri="{FF2B5EF4-FFF2-40B4-BE49-F238E27FC236}">
+                <a16:creationId xmlns:a16="http://schemas.microsoft.com/office/drawing/2014/main" id="{4DA6250F-5BA5-7248-BB8C-0BAE3FBF011F}"/>
+              </a:ext>
+            </a:extLst>
+          </p:cNvPr>
+          <p:cNvCxnSpPr>
+            <a:cxnSpLocks/>
+            <a:stCxn id="106" idx="0"/>
+          </p:cNvCxnSpPr>
+          <p:nvPr/>
+        </p:nvCxnSpPr>
+        <p:spPr>
+          <a:xfrm flipV="1">
+            <a:off x="7768449" y="5272615"/>
+            <a:ext cx="1559742" cy="2045816"/>
+          </a:xfrm>
+          <a:prstGeom prst="line">
+            <a:avLst/>
+          </a:prstGeom>
+          <a:ln w="12700">
+            <a:solidFill>
+              <a:schemeClr val="tx1"/>
+            </a:solidFill>
+          </a:ln>
+        </p:spPr>
+        <p:style>
+          <a:lnRef idx="1">
+            <a:schemeClr val="accent1"/>
+          </a:lnRef>
+          <a:fillRef idx="0">
+            <a:schemeClr val="accent1"/>
+          </a:fillRef>
+          <a:effectRef idx="0">
+            <a:schemeClr val="accent1"/>
+          </a:effectRef>
+          <a:fontRef idx="minor">
+            <a:schemeClr val="tx1"/>
+          </a:fontRef>
+        </p:style>
+      </p:cxnSp>
+      <p:sp>
+        <p:nvSpPr>
+          <p:cNvPr id="108" name="TextBox 107">
+            <a:extLst>
+              <a:ext uri="{FF2B5EF4-FFF2-40B4-BE49-F238E27FC236}">
+                <a16:creationId xmlns:a16="http://schemas.microsoft.com/office/drawing/2014/main" id="{B7B2DE5C-19C4-8843-995F-0D73585F669C}"/>
+              </a:ext>
+            </a:extLst>
+          </p:cNvPr>
+          <p:cNvSpPr txBox="1"/>
+          <p:nvPr/>
+        </p:nvSpPr>
+        <p:spPr>
+          <a:xfrm rot="19820780">
+            <a:off x="8223283" y="5913796"/>
+            <a:ext cx="851855" cy="276999"/>
+          </a:xfrm>
+          <a:prstGeom prst="rect">
+            <a:avLst/>
+          </a:prstGeom>
+          <a:noFill/>
+          <a:ln w="12700">
+            <a:noFill/>
+          </a:ln>
+        </p:spPr>
+        <p:txBody>
+          <a:bodyPr wrap="square" rtlCol="0">
+            <a:spAutoFit/>
+          </a:bodyPr>
+          <a:lstStyle/>
+          <a:p>
+            <a:pPr>
+              <a:defRPr/>
+            </a:pPr>
+            <a:r>
+              <a:rPr lang="en-US" sz="1200" dirty="0">
+                <a:solidFill>
+                  <a:prstClr val="black"/>
+                </a:solidFill>
+                <a:latin typeface="Arial Narrow" panose="020B0604020202020204" pitchFamily="34" charset="0"/>
+              </a:rPr>
+              <a:t>has</a:t>
+            </a:r>
+          </a:p>
+        </p:txBody>
+      </p:sp>
+      <p:sp>
+        <p:nvSpPr>
+          <p:cNvPr id="111" name="Rectangle 110">
+            <a:extLst>
+              <a:ext uri="{FF2B5EF4-FFF2-40B4-BE49-F238E27FC236}">
+                <a16:creationId xmlns:a16="http://schemas.microsoft.com/office/drawing/2014/main" id="{C0A586B0-2074-5B4A-B470-CA6BBE5126AA}"/>
+              </a:ext>
+            </a:extLst>
+          </p:cNvPr>
+          <p:cNvSpPr/>
+          <p:nvPr/>
+        </p:nvSpPr>
+        <p:spPr>
+          <a:xfrm rot="3544676">
+            <a:off x="8108423" y="6345312"/>
+            <a:ext cx="352767" cy="276999"/>
+          </a:xfrm>
+          <a:prstGeom prst="rect">
+            <a:avLst/>
+          </a:prstGeom>
+        </p:spPr>
+        <p:txBody>
+          <a:bodyPr wrap="square">
+            <a:spAutoFit/>
+          </a:bodyPr>
+          <a:lstStyle/>
+          <a:p>
+            <a:pPr algn="ctr">
+              <a:defRPr/>
+            </a:pPr>
+            <a:r>
+              <a:rPr lang="en-US" sz="1200" dirty="0">
+                <a:solidFill>
+                  <a:prstClr val="black"/>
+                </a:solidFill>
+                <a:latin typeface="Arial Narrow" panose="020B0604020202020204" pitchFamily="34" charset="0"/>
+                <a:cs typeface="Arial Narrow" panose="020B0604020202020204" pitchFamily="34" charset="0"/>
+              </a:rPr>
+              <a:t>▼</a:t>
+            </a:r>
+            <a:endParaRPr lang="en-US" sz="1200" dirty="0">
+              <a:solidFill>
+                <a:prstClr val="black"/>
+              </a:solidFill>
+              <a:latin typeface="Calibri" panose="020F0502020204030204"/>
+            </a:endParaRPr>
+          </a:p>
+        </p:txBody>
+      </p:sp>
+      <p:sp>
+        <p:nvSpPr>
+          <p:cNvPr id="87" name="TextBox 86">
+            <a:extLst>
+              <a:ext uri="{FF2B5EF4-FFF2-40B4-BE49-F238E27FC236}">
+                <a16:creationId xmlns:a16="http://schemas.microsoft.com/office/drawing/2014/main" id="{5A80F4C2-E949-8E4D-B5C8-A5120403A83D}"/>
+              </a:ext>
+            </a:extLst>
+          </p:cNvPr>
+          <p:cNvSpPr txBox="1"/>
+          <p:nvPr/>
+        </p:nvSpPr>
+        <p:spPr>
+          <a:xfrm>
+            <a:off x="9034979" y="5086456"/>
+            <a:ext cx="301686" cy="369332"/>
+          </a:xfrm>
+          <a:prstGeom prst="rect">
+            <a:avLst/>
+          </a:prstGeom>
+          <a:noFill/>
+        </p:spPr>
+        <p:txBody>
+          <a:bodyPr wrap="none" rtlCol="0">
+            <a:spAutoFit/>
+          </a:bodyPr>
+          <a:lstStyle/>
+          <a:p>
+            <a:r>
+              <a:rPr lang="en-US" dirty="0"/>
+              <a:t>1</a:t>
+            </a:r>
+          </a:p>
+        </p:txBody>
+      </p:sp>
+      <p:sp>
+        <p:nvSpPr>
+          <p:cNvPr id="88" name="TextBox 87">
+            <a:extLst>
+              <a:ext uri="{FF2B5EF4-FFF2-40B4-BE49-F238E27FC236}">
+                <a16:creationId xmlns:a16="http://schemas.microsoft.com/office/drawing/2014/main" id="{31C579CB-8E85-C94C-B8D7-AD9ED2DD6D9A}"/>
+              </a:ext>
+            </a:extLst>
+          </p:cNvPr>
+          <p:cNvSpPr txBox="1"/>
+          <p:nvPr/>
+        </p:nvSpPr>
+        <p:spPr>
+          <a:xfrm>
+            <a:off x="7536782" y="6946232"/>
+            <a:ext cx="300082" cy="369332"/>
+          </a:xfrm>
+          <a:prstGeom prst="rect">
+            <a:avLst/>
+          </a:prstGeom>
+          <a:noFill/>
+        </p:spPr>
+        <p:txBody>
+          <a:bodyPr wrap="none" rtlCol="0">
+            <a:spAutoFit/>
+          </a:bodyPr>
+          <a:lstStyle/>
+          <a:p>
+            <a:r>
+              <a:rPr lang="en-US" dirty="0"/>
+              <a:t>*</a:t>
+            </a:r>
+          </a:p>
+        </p:txBody>
+      </p:sp>
+      <p:sp>
+        <p:nvSpPr>
+          <p:cNvPr id="113" name="TextBox 112">
+            <a:extLst>
+              <a:ext uri="{FF2B5EF4-FFF2-40B4-BE49-F238E27FC236}">
+                <a16:creationId xmlns:a16="http://schemas.microsoft.com/office/drawing/2014/main" id="{54E17919-037E-1541-A117-6C5C2A5B6726}"/>
+              </a:ext>
+            </a:extLst>
+          </p:cNvPr>
+          <p:cNvSpPr txBox="1"/>
+          <p:nvPr/>
+        </p:nvSpPr>
+        <p:spPr>
+          <a:xfrm rot="20149495">
+            <a:off x="8956683" y="5438884"/>
+            <a:ext cx="901226" cy="276999"/>
+          </a:xfrm>
+          <a:prstGeom prst="rect">
+            <a:avLst/>
+          </a:prstGeom>
+          <a:noFill/>
+          <a:ln w="12700">
+            <a:noFill/>
+          </a:ln>
+        </p:spPr>
+        <p:txBody>
+          <a:bodyPr wrap="square" rtlCol="0">
+            <a:spAutoFit/>
+          </a:bodyPr>
+          <a:lstStyle/>
+          <a:p>
+            <a:pPr>
+              <a:defRPr/>
+            </a:pPr>
+            <a:r>
+              <a:rPr lang="en-US" sz="1200" dirty="0">
+                <a:solidFill>
+                  <a:prstClr val="black"/>
+                </a:solidFill>
+                <a:latin typeface="Arial Narrow" panose="020B0604020202020204" pitchFamily="34" charset="0"/>
+              </a:rPr>
+              <a:t>item</a:t>
+            </a:r>
+          </a:p>
+        </p:txBody>
+      </p:sp>
+      <p:sp>
+        <p:nvSpPr>
+          <p:cNvPr id="114" name="TextBox 113">
+            <a:extLst>
+              <a:ext uri="{FF2B5EF4-FFF2-40B4-BE49-F238E27FC236}">
+                <a16:creationId xmlns:a16="http://schemas.microsoft.com/office/drawing/2014/main" id="{98AE1591-2A1D-2544-A095-775CE08486BB}"/>
+              </a:ext>
+            </a:extLst>
+          </p:cNvPr>
+          <p:cNvSpPr txBox="1"/>
+          <p:nvPr/>
+        </p:nvSpPr>
+        <p:spPr>
+          <a:xfrm rot="19941039">
+            <a:off x="7798940" y="6903850"/>
+            <a:ext cx="879466" cy="276999"/>
+          </a:xfrm>
+          <a:prstGeom prst="rect">
+            <a:avLst/>
+          </a:prstGeom>
+          <a:noFill/>
+          <a:ln w="12700">
+            <a:noFill/>
+          </a:ln>
+        </p:spPr>
+        <p:txBody>
+          <a:bodyPr wrap="square" rtlCol="0">
+            <a:spAutoFit/>
+          </a:bodyPr>
+          <a:lstStyle/>
+          <a:p>
+            <a:pPr>
+              <a:defRPr/>
+            </a:pPr>
+            <a:r>
+              <a:rPr lang="en-US" sz="1200" dirty="0">
+                <a:solidFill>
+                  <a:prstClr val="black"/>
+                </a:solidFill>
+                <a:latin typeface="Arial Narrow" panose="020B0604020202020204" pitchFamily="34" charset="0"/>
+              </a:rPr>
+              <a:t>pictures</a:t>
+            </a:r>
+          </a:p>
+        </p:txBody>
+      </p:sp>
+      <p:sp>
+        <p:nvSpPr>
+          <p:cNvPr id="89" name="TextBox 88">
+            <a:extLst>
+              <a:ext uri="{FF2B5EF4-FFF2-40B4-BE49-F238E27FC236}">
+                <a16:creationId xmlns:a16="http://schemas.microsoft.com/office/drawing/2014/main" id="{E47EC64F-0711-3548-97D5-081BB9153B2C}"/>
+              </a:ext>
+            </a:extLst>
+          </p:cNvPr>
+          <p:cNvSpPr txBox="1"/>
+          <p:nvPr/>
+        </p:nvSpPr>
+        <p:spPr>
+          <a:xfrm>
+            <a:off x="3106973" y="4460303"/>
+            <a:ext cx="455574" cy="276999"/>
+          </a:xfrm>
+          <a:prstGeom prst="rect">
+            <a:avLst/>
+          </a:prstGeom>
+          <a:noFill/>
+        </p:spPr>
+        <p:txBody>
+          <a:bodyPr wrap="none" rtlCol="0">
+            <a:spAutoFit/>
+          </a:bodyPr>
+          <a:lstStyle/>
+          <a:p>
+            <a:r>
+              <a:rPr lang="en-US" sz="1200" dirty="0"/>
+              <a:t>user</a:t>
+            </a:r>
+          </a:p>
+        </p:txBody>
+      </p:sp>
+      <p:sp>
+        <p:nvSpPr>
+          <p:cNvPr id="115" name="TextBox 114">
+            <a:extLst>
+              <a:ext uri="{FF2B5EF4-FFF2-40B4-BE49-F238E27FC236}">
+                <a16:creationId xmlns:a16="http://schemas.microsoft.com/office/drawing/2014/main" id="{64113D87-BC8A-5643-8894-A5510AA3B034}"/>
+              </a:ext>
+            </a:extLst>
+          </p:cNvPr>
+          <p:cNvSpPr txBox="1"/>
+          <p:nvPr/>
+        </p:nvSpPr>
+        <p:spPr>
+          <a:xfrm>
+            <a:off x="4023819" y="7130898"/>
+            <a:ext cx="602665" cy="276999"/>
+          </a:xfrm>
+          <a:prstGeom prst="rect">
+            <a:avLst/>
+          </a:prstGeom>
+          <a:noFill/>
+        </p:spPr>
+        <p:txBody>
+          <a:bodyPr wrap="none" rtlCol="0">
+            <a:spAutoFit/>
+          </a:bodyPr>
+          <a:lstStyle/>
+          <a:p>
+            <a:r>
+              <a:rPr lang="en-US" sz="1200" dirty="0"/>
+              <a:t>review</a:t>
             </a:r>
           </a:p>
         </p:txBody>

</xml_diff>